<commit_message>
Created new variables in "MIDTERM_EDA_FINAL"
</commit_message>
<xml_diff>
--- a/Final Midterm PPT DATS 6101.pptx
+++ b/Final Midterm PPT DATS 6101.pptx
@@ -221,7 +221,7 @@
           <a:p>
             <a:fld id="{9F7B77B6-A42E-A048-A74D-7373B9F65E74}" type="datetimeFigureOut">
               <a:rPr lang="en-US" smtClean="0"/>
-              <a:t>11/7/22</a:t>
+              <a:t>11/7/2022</a:t>
             </a:fld>
             <a:endParaRPr lang="en-US"/>
           </a:p>
@@ -703,7 +703,7 @@
           <a:p>
             <a:fld id="{5DCE9035-4A16-5448-9596-651BFBF89D25}" type="datetimeFigureOut">
               <a:rPr lang="en-US" smtClean="0"/>
-              <a:t>11/7/22</a:t>
+              <a:t>11/7/2022</a:t>
             </a:fld>
             <a:endParaRPr lang="en-US"/>
           </a:p>
@@ -873,7 +873,7 @@
           <a:p>
             <a:fld id="{5DCE9035-4A16-5448-9596-651BFBF89D25}" type="datetimeFigureOut">
               <a:rPr lang="en-US" smtClean="0"/>
-              <a:t>11/7/22</a:t>
+              <a:t>11/7/2022</a:t>
             </a:fld>
             <a:endParaRPr lang="en-US"/>
           </a:p>
@@ -1053,7 +1053,7 @@
           <a:p>
             <a:fld id="{5DCE9035-4A16-5448-9596-651BFBF89D25}" type="datetimeFigureOut">
               <a:rPr lang="en-US" smtClean="0"/>
-              <a:t>11/7/22</a:t>
+              <a:t>11/7/2022</a:t>
             </a:fld>
             <a:endParaRPr lang="en-US"/>
           </a:p>
@@ -1223,7 +1223,7 @@
           <a:p>
             <a:fld id="{5DCE9035-4A16-5448-9596-651BFBF89D25}" type="datetimeFigureOut">
               <a:rPr lang="en-US" smtClean="0"/>
-              <a:t>11/7/22</a:t>
+              <a:t>11/7/2022</a:t>
             </a:fld>
             <a:endParaRPr lang="en-US"/>
           </a:p>
@@ -1469,7 +1469,7 @@
           <a:p>
             <a:fld id="{5DCE9035-4A16-5448-9596-651BFBF89D25}" type="datetimeFigureOut">
               <a:rPr lang="en-US" smtClean="0"/>
-              <a:t>11/7/22</a:t>
+              <a:t>11/7/2022</a:t>
             </a:fld>
             <a:endParaRPr lang="en-US"/>
           </a:p>
@@ -1701,7 +1701,7 @@
           <a:p>
             <a:fld id="{5DCE9035-4A16-5448-9596-651BFBF89D25}" type="datetimeFigureOut">
               <a:rPr lang="en-US" smtClean="0"/>
-              <a:t>11/7/22</a:t>
+              <a:t>11/7/2022</a:t>
             </a:fld>
             <a:endParaRPr lang="en-US"/>
           </a:p>
@@ -2068,7 +2068,7 @@
           <a:p>
             <a:fld id="{5DCE9035-4A16-5448-9596-651BFBF89D25}" type="datetimeFigureOut">
               <a:rPr lang="en-US" smtClean="0"/>
-              <a:t>11/7/22</a:t>
+              <a:t>11/7/2022</a:t>
             </a:fld>
             <a:endParaRPr lang="en-US"/>
           </a:p>
@@ -2186,7 +2186,7 @@
           <a:p>
             <a:fld id="{5DCE9035-4A16-5448-9596-651BFBF89D25}" type="datetimeFigureOut">
               <a:rPr lang="en-US" smtClean="0"/>
-              <a:t>11/7/22</a:t>
+              <a:t>11/7/2022</a:t>
             </a:fld>
             <a:endParaRPr lang="en-US"/>
           </a:p>
@@ -2281,7 +2281,7 @@
           <a:p>
             <a:fld id="{5DCE9035-4A16-5448-9596-651BFBF89D25}" type="datetimeFigureOut">
               <a:rPr lang="en-US" smtClean="0"/>
-              <a:t>11/7/22</a:t>
+              <a:t>11/7/2022</a:t>
             </a:fld>
             <a:endParaRPr lang="en-US"/>
           </a:p>
@@ -2558,7 +2558,7 @@
           <a:p>
             <a:fld id="{5DCE9035-4A16-5448-9596-651BFBF89D25}" type="datetimeFigureOut">
               <a:rPr lang="en-US" smtClean="0"/>
-              <a:t>11/7/22</a:t>
+              <a:t>11/7/2022</a:t>
             </a:fld>
             <a:endParaRPr lang="en-US"/>
           </a:p>
@@ -2815,7 +2815,7 @@
           <a:p>
             <a:fld id="{5DCE9035-4A16-5448-9596-651BFBF89D25}" type="datetimeFigureOut">
               <a:rPr lang="en-US" smtClean="0"/>
-              <a:t>11/7/22</a:t>
+              <a:t>11/7/2022</a:t>
             </a:fld>
             <a:endParaRPr lang="en-US"/>
           </a:p>
@@ -3028,7 +3028,7 @@
           <a:p>
             <a:fld id="{5DCE9035-4A16-5448-9596-651BFBF89D25}" type="datetimeFigureOut">
               <a:rPr lang="en-US" smtClean="0"/>
-              <a:t>11/7/22</a:t>
+              <a:t>11/7/2022</a:t>
             </a:fld>
             <a:endParaRPr lang="en-US"/>
           </a:p>
@@ -6875,7 +6875,7 @@
         </p:nvSpPr>
         <p:spPr>
           <a:xfrm>
-            <a:off x="0" y="0"/>
+            <a:off x="10391" y="10391"/>
             <a:ext cx="12192000" cy="6858000"/>
           </a:xfrm>
           <a:prstGeom prst="rect">
@@ -7355,7 +7355,7 @@
           <p:nvPr>
             <p:extLst>
               <p:ext uri="{D42A27DB-BD31-4B8C-83A1-F6EECF244321}">
-                <p14:modId xmlns:p14="http://schemas.microsoft.com/office/powerpoint/2010/main" val="1124262007"/>
+                <p14:modId xmlns:p14="http://schemas.microsoft.com/office/powerpoint/2010/main" val="2221913754"/>
               </p:ext>
             </p:extLst>
           </p:nvPr>
@@ -7597,7 +7597,7 @@
                         <a:rPr lang="en-US" sz="1400" dirty="0">
                           <a:latin typeface="Helvetica" pitchFamily="2" charset="0"/>
                         </a:rPr>
-                        <a:t>TRUE</a:t>
+                        <a:t>Attack</a:t>
                       </a:r>
                     </a:p>
                   </a:txBody>
@@ -9982,7 +9982,7 @@
                 </a:solidFill>
                 <a:latin typeface="Helvetica" pitchFamily="2" charset="0"/>
               </a:rPr>
-              <a:t>Univariate Analysis #3: Manner of Death</a:t>
+              <a:t>Univariate Analysis #2: Manner of Death</a:t>
             </a:r>
           </a:p>
         </p:txBody>
@@ -10216,7 +10216,7 @@
                 </a:solidFill>
                 <a:latin typeface="Helvetica" pitchFamily="2" charset="0"/>
               </a:rPr>
-              <a:t>Univariate Analysis #4: Threat Level</a:t>
+              <a:t>Univariate Analysis #3: Threat Level</a:t>
             </a:r>
           </a:p>
         </p:txBody>
@@ -10448,7 +10448,7 @@
                 </a:solidFill>
                 <a:latin typeface="Helvetica" pitchFamily="2" charset="0"/>
               </a:rPr>
-              <a:t>Univariate Analysis #5: Age</a:t>
+              <a:t>Univariate Analysis #4: Age</a:t>
             </a:r>
           </a:p>
         </p:txBody>

</xml_diff>

<commit_message>
Did Powerpoint and fixed code
</commit_message>
<xml_diff>
--- a/Final Midterm PPT DATS 6101.pptx
+++ b/Final Midterm PPT DATS 6101.pptx
@@ -221,7 +221,7 @@
           <a:p>
             <a:fld id="{9F7B77B6-A42E-A048-A74D-7373B9F65E74}" type="datetimeFigureOut">
               <a:rPr lang="en-US" smtClean="0"/>
-              <a:t>11/7/2022</a:t>
+              <a:t>12/9/2022</a:t>
             </a:fld>
             <a:endParaRPr lang="en-US"/>
           </a:p>
@@ -703,7 +703,7 @@
           <a:p>
             <a:fld id="{5DCE9035-4A16-5448-9596-651BFBF89D25}" type="datetimeFigureOut">
               <a:rPr lang="en-US" smtClean="0"/>
-              <a:t>11/7/2022</a:t>
+              <a:t>12/9/2022</a:t>
             </a:fld>
             <a:endParaRPr lang="en-US"/>
           </a:p>
@@ -873,7 +873,7 @@
           <a:p>
             <a:fld id="{5DCE9035-4A16-5448-9596-651BFBF89D25}" type="datetimeFigureOut">
               <a:rPr lang="en-US" smtClean="0"/>
-              <a:t>11/7/2022</a:t>
+              <a:t>12/9/2022</a:t>
             </a:fld>
             <a:endParaRPr lang="en-US"/>
           </a:p>
@@ -1053,7 +1053,7 @@
           <a:p>
             <a:fld id="{5DCE9035-4A16-5448-9596-651BFBF89D25}" type="datetimeFigureOut">
               <a:rPr lang="en-US" smtClean="0"/>
-              <a:t>11/7/2022</a:t>
+              <a:t>12/9/2022</a:t>
             </a:fld>
             <a:endParaRPr lang="en-US"/>
           </a:p>
@@ -1223,7 +1223,7 @@
           <a:p>
             <a:fld id="{5DCE9035-4A16-5448-9596-651BFBF89D25}" type="datetimeFigureOut">
               <a:rPr lang="en-US" smtClean="0"/>
-              <a:t>11/7/2022</a:t>
+              <a:t>12/9/2022</a:t>
             </a:fld>
             <a:endParaRPr lang="en-US"/>
           </a:p>
@@ -1469,7 +1469,7 @@
           <a:p>
             <a:fld id="{5DCE9035-4A16-5448-9596-651BFBF89D25}" type="datetimeFigureOut">
               <a:rPr lang="en-US" smtClean="0"/>
-              <a:t>11/7/2022</a:t>
+              <a:t>12/9/2022</a:t>
             </a:fld>
             <a:endParaRPr lang="en-US"/>
           </a:p>
@@ -1701,7 +1701,7 @@
           <a:p>
             <a:fld id="{5DCE9035-4A16-5448-9596-651BFBF89D25}" type="datetimeFigureOut">
               <a:rPr lang="en-US" smtClean="0"/>
-              <a:t>11/7/2022</a:t>
+              <a:t>12/9/2022</a:t>
             </a:fld>
             <a:endParaRPr lang="en-US"/>
           </a:p>
@@ -2068,7 +2068,7 @@
           <a:p>
             <a:fld id="{5DCE9035-4A16-5448-9596-651BFBF89D25}" type="datetimeFigureOut">
               <a:rPr lang="en-US" smtClean="0"/>
-              <a:t>11/7/2022</a:t>
+              <a:t>12/9/2022</a:t>
             </a:fld>
             <a:endParaRPr lang="en-US"/>
           </a:p>
@@ -2186,7 +2186,7 @@
           <a:p>
             <a:fld id="{5DCE9035-4A16-5448-9596-651BFBF89D25}" type="datetimeFigureOut">
               <a:rPr lang="en-US" smtClean="0"/>
-              <a:t>11/7/2022</a:t>
+              <a:t>12/9/2022</a:t>
             </a:fld>
             <a:endParaRPr lang="en-US"/>
           </a:p>
@@ -2281,7 +2281,7 @@
           <a:p>
             <a:fld id="{5DCE9035-4A16-5448-9596-651BFBF89D25}" type="datetimeFigureOut">
               <a:rPr lang="en-US" smtClean="0"/>
-              <a:t>11/7/2022</a:t>
+              <a:t>12/9/2022</a:t>
             </a:fld>
             <a:endParaRPr lang="en-US"/>
           </a:p>
@@ -2558,7 +2558,7 @@
           <a:p>
             <a:fld id="{5DCE9035-4A16-5448-9596-651BFBF89D25}" type="datetimeFigureOut">
               <a:rPr lang="en-US" smtClean="0"/>
-              <a:t>11/7/2022</a:t>
+              <a:t>12/9/2022</a:t>
             </a:fld>
             <a:endParaRPr lang="en-US"/>
           </a:p>
@@ -2815,7 +2815,7 @@
           <a:p>
             <a:fld id="{5DCE9035-4A16-5448-9596-651BFBF89D25}" type="datetimeFigureOut">
               <a:rPr lang="en-US" smtClean="0"/>
-              <a:t>11/7/2022</a:t>
+              <a:t>12/9/2022</a:t>
             </a:fld>
             <a:endParaRPr lang="en-US"/>
           </a:p>
@@ -3028,7 +3028,7 @@
           <a:p>
             <a:fld id="{5DCE9035-4A16-5448-9596-651BFBF89D25}" type="datetimeFigureOut">
               <a:rPr lang="en-US" smtClean="0"/>
-              <a:t>11/7/2022</a:t>
+              <a:t>12/9/2022</a:t>
             </a:fld>
             <a:endParaRPr lang="en-US"/>
           </a:p>

</xml_diff>